<commit_message>
opcode length = 6 bits
</commit_message>
<xml_diff>
--- a/cs447jb_rec5_feb16_and_19.pptx
+++ b/cs447jb_rec5_feb16_and_19.pptx
@@ -5033,7 +5033,7 @@
                   <a:srgbClr val="0070C0"/>
                 </a:solidFill>
               </a:rPr>
-              <a:t>5 bits long, can be found on the Green Sheet</a:t>
+              <a:t>6 bits long, can be found on the Green Sheet</a:t>
             </a:r>
           </a:p>
         </p:txBody>
@@ -5317,7 +5317,7 @@
         </p:blipFill>
         <p:spPr>
           <a:xfrm>
-            <a:off x="182880" y="1704543"/>
+            <a:off x="182880" y="1581308"/>
             <a:ext cx="8778240" cy="3448913"/>
           </a:xfrm>
           <a:prstGeom prst="rect">

</xml_diff>